<commit_message>
Lectures 1-3 plus exercises
</commit_message>
<xml_diff>
--- a/Disused code/Misc/Lectures/1 Introduction/L1a Foreword.pptx
+++ b/Disused code/Misc/Lectures/1 Introduction/L1a Foreword.pptx
@@ -140,6 +140,22 @@
       </a:defRPr>
     </a:lvl9pPr>
   </p:defaultTextStyle>
+  <p:extLst>
+    <p:ext uri="{EFAFB233-063F-42B5-8137-9DF3F51BA10A}">
+      <p15:sldGuideLst xmlns:p15="http://schemas.microsoft.com/office/powerpoint/2012/main">
+        <p15:guide id="1" orient="horz" pos="2160">
+          <p15:clr>
+            <a:srgbClr val="A4A3A4"/>
+          </p15:clr>
+        </p15:guide>
+        <p15:guide id="2" pos="2880">
+          <p15:clr>
+            <a:srgbClr val="A4A3A4"/>
+          </p15:clr>
+        </p15:guide>
+      </p15:sldGuideLst>
+    </p:ext>
+  </p:extLst>
 </p:presentation>
 </file>
 
@@ -349,7 +365,7 @@
               <a:pPr>
                 <a:defRPr/>
               </a:pPr>
-              <a:t>4/19/2017</a:t>
+              <a:t>5/3/2017</a:t>
             </a:fld>
             <a:endParaRPr lang="en-US" dirty="0"/>
           </a:p>
@@ -724,7 +740,7 @@
               <a:pPr>
                 <a:defRPr/>
               </a:pPr>
-              <a:t>4/19/2017</a:t>
+              <a:t>5/3/2017</a:t>
             </a:fld>
             <a:endParaRPr lang="en-US" dirty="0"/>
           </a:p>
@@ -1007,7 +1023,7 @@
               <a:pPr>
                 <a:defRPr/>
               </a:pPr>
-              <a:t>4/19/2017</a:t>
+              <a:t>5/3/2017</a:t>
             </a:fld>
             <a:endParaRPr lang="en-US" dirty="0"/>
           </a:p>
@@ -1595,7 +1611,7 @@
               <a:pPr>
                 <a:defRPr/>
               </a:pPr>
-              <a:t>4/19/2017</a:t>
+              <a:t>5/3/2017</a:t>
             </a:fld>
             <a:endParaRPr lang="en-US" dirty="0"/>
           </a:p>
@@ -1880,7 +1896,7 @@
               <a:pPr>
                 <a:defRPr/>
               </a:pPr>
-              <a:t>4/19/2017</a:t>
+              <a:t>5/3/2017</a:t>
             </a:fld>
             <a:endParaRPr lang="en-US" dirty="0"/>
           </a:p>
@@ -2513,7 +2529,7 @@
               <a:pPr>
                 <a:defRPr/>
               </a:pPr>
-              <a:t>4/19/2017</a:t>
+              <a:t>5/3/2017</a:t>
             </a:fld>
             <a:endParaRPr lang="en-US" dirty="0"/>
           </a:p>
@@ -3438,7 +3454,7 @@
               <a:pPr>
                 <a:defRPr/>
               </a:pPr>
-              <a:t>4/19/2017</a:t>
+              <a:t>5/3/2017</a:t>
             </a:fld>
             <a:endParaRPr lang="en-US" dirty="0"/>
           </a:p>
@@ -3699,7 +3715,7 @@
               <a:pPr>
                 <a:defRPr/>
               </a:pPr>
-              <a:t>4/19/2017</a:t>
+              <a:t>5/3/2017</a:t>
             </a:fld>
             <a:endParaRPr lang="en-US" dirty="0"/>
           </a:p>
@@ -3970,7 +3986,7 @@
               <a:pPr>
                 <a:defRPr/>
               </a:pPr>
-              <a:t>4/19/2017</a:t>
+              <a:t>5/3/2017</a:t>
             </a:fld>
             <a:endParaRPr lang="en-US" dirty="0"/>
           </a:p>
@@ -4238,7 +4254,7 @@
               <a:pPr>
                 <a:defRPr/>
               </a:pPr>
-              <a:t>4/19/2017</a:t>
+              <a:t>5/3/2017</a:t>
             </a:fld>
             <a:endParaRPr lang="en-US" dirty="0"/>
           </a:p>
@@ -4522,7 +4538,7 @@
               <a:pPr>
                 <a:defRPr/>
               </a:pPr>
-              <a:t>4/19/2017</a:t>
+              <a:t>5/3/2017</a:t>
             </a:fld>
             <a:endParaRPr lang="en-US" dirty="0"/>
           </a:p>
@@ -4781,7 +4797,7 @@
               <a:pPr>
                 <a:defRPr/>
               </a:pPr>
-              <a:t>4/19/2017</a:t>
+              <a:t>5/3/2017</a:t>
             </a:fld>
             <a:endParaRPr lang="en-US" dirty="0"/>
           </a:p>
@@ -5201,7 +5217,7 @@
               <a:pPr>
                 <a:defRPr/>
               </a:pPr>
-              <a:t>4/19/2017</a:t>
+              <a:t>5/3/2017</a:t>
             </a:fld>
             <a:endParaRPr lang="en-US" dirty="0"/>
           </a:p>
@@ -5346,7 +5362,7 @@
               <a:pPr>
                 <a:defRPr/>
               </a:pPr>
-              <a:t>4/19/2017</a:t>
+              <a:t>5/3/2017</a:t>
             </a:fld>
             <a:endParaRPr lang="en-US" dirty="0"/>
           </a:p>
@@ -5468,7 +5484,7 @@
               <a:pPr>
                 <a:defRPr/>
               </a:pPr>
-              <a:t>4/19/2017</a:t>
+              <a:t>5/3/2017</a:t>
             </a:fld>
             <a:endParaRPr lang="en-US" dirty="0"/>
           </a:p>
@@ -5770,7 +5786,7 @@
               <a:pPr>
                 <a:defRPr/>
               </a:pPr>
-              <a:t>4/19/2017</a:t>
+              <a:t>5/3/2017</a:t>
             </a:fld>
             <a:endParaRPr lang="en-US" dirty="0"/>
           </a:p>
@@ -6083,7 +6099,7 @@
               <a:pPr>
                 <a:defRPr/>
               </a:pPr>
-              <a:t>4/19/2017</a:t>
+              <a:t>5/3/2017</a:t>
             </a:fld>
             <a:endParaRPr lang="en-US" dirty="0"/>
           </a:p>
@@ -6397,7 +6413,7 @@
               <a:pPr>
                 <a:defRPr/>
               </a:pPr>
-              <a:t>4/19/2017</a:t>
+              <a:t>5/3/2017</a:t>
             </a:fld>
             <a:endParaRPr lang="en-US" dirty="0"/>
           </a:p>
@@ -10255,7 +10271,7 @@
           <a:lstStyle/>
           <a:p>
             <a:r>
-              <a:rPr lang="en-CA" altLang="en-US" smtClean="0"/>
+              <a:rPr lang="en-CA" altLang="en-US" dirty="0" smtClean="0"/>
               <a:t>Resources and support</a:t>
             </a:r>
           </a:p>
@@ -10271,7 +10287,12 @@
             <p:ph idx="1"/>
           </p:nvPr>
         </p:nvSpPr>
-        <p:spPr/>
+        <p:spPr>
+          <a:xfrm>
+            <a:off x="839787" y="1825625"/>
+            <a:ext cx="7938453" cy="4351338"/>
+          </a:xfrm>
+        </p:spPr>
         <p:txBody>
           <a:bodyPr rtlCol="0">
             <a:normAutofit/>
@@ -10298,9 +10319,61 @@
                 <a:solidFill>
                   <a:srgbClr val="27AFE5"/>
                 </a:solidFill>
+                <a:hlinkClick r:id="rId2"/>
               </a:rPr>
               <a:t>www.datalimitedtoolkit.org</a:t>
             </a:r>
+            <a:endParaRPr lang="en-CA" dirty="0" smtClean="0">
+              <a:solidFill>
+                <a:srgbClr val="27AFE5"/>
+              </a:solidFill>
+            </a:endParaRPr>
+          </a:p>
+          <a:p>
+            <a:pPr fontAlgn="auto">
+              <a:spcBef>
+                <a:spcPts val="2400"/>
+              </a:spcBef>
+              <a:spcAft>
+                <a:spcPts val="0"/>
+              </a:spcAft>
+              <a:buFont typeface="Arial" panose="020B0604020202020204" pitchFamily="34" charset="0"/>
+              <a:buChar char="•"/>
+              <a:defRPr/>
+            </a:pPr>
+            <a:r>
+              <a:rPr lang="en-CA" dirty="0" smtClean="0"/>
+              <a:t>Online </a:t>
+            </a:r>
+            <a:r>
+              <a:rPr lang="en-CA" dirty="0"/>
+              <a:t>help </a:t>
+            </a:r>
+            <a:r>
+              <a:rPr lang="en-CA" dirty="0" smtClean="0"/>
+              <a:t>                   </a:t>
+            </a:r>
+            <a:r>
+              <a:rPr lang="en-CA" sz="2000" dirty="0" smtClean="0">
+                <a:solidFill>
+                  <a:srgbClr val="27AFE5"/>
+                </a:solidFill>
+              </a:rPr>
+              <a:t>https</a:t>
+            </a:r>
+            <a:r>
+              <a:rPr lang="en-CA" sz="2000" dirty="0">
+                <a:solidFill>
+                  <a:srgbClr val="27AFE5"/>
+                </a:solidFill>
+              </a:rPr>
+              <a:t>://dlmtool.github.io/DLMtool/index.html</a:t>
+            </a:r>
+            <a:endParaRPr lang="en-CA" sz="2000" dirty="0" smtClean="0">
+              <a:solidFill>
+                <a:srgbClr val="27AFE5"/>
+              </a:solidFill>
+            </a:endParaRPr>
           </a:p>
           <a:p>
             <a:pPr fontAlgn="auto">
@@ -10710,7 +10783,7 @@
   <a:extraClrSchemeLst/>
   <a:extLst>
     <a:ext uri="{05A4C25C-085E-4340-85A3-A5531E510DB2}">
-      <thm15:themeFamily xmlns:thm15="http://schemas.microsoft.com/office/thememl/2012/main" xmlns="" name="Depth" id="{7BEAFC2A-325C-49C4-AC08-2B765DA903F9}" vid="{1735E755-43E6-43AA-ABA2-C989ECC79AF5}"/>
+      <thm15:themeFamily xmlns:thm15="http://schemas.microsoft.com/office/thememl/2012/main" name="Depth" id="{7BEAFC2A-325C-49C4-AC08-2B765DA903F9}" vid="{1735E755-43E6-43AA-ABA2-C989ECC79AF5}"/>
     </a:ext>
   </a:extLst>
 </a:theme>

</xml_diff>